<commit_message>
add change to powerpoint
</commit_message>
<xml_diff>
--- a/week_03/day_4/Ethics_presentation.pptx
+++ b/week_03/day_4/Ethics_presentation.pptx
@@ -6,8 +6,8 @@
   </p:sldMasterIdLst>
   <p:sldIdLst>
     <p:sldId id="256" r:id="rId2"/>
-    <p:sldId id="257" r:id="rId3"/>
-    <p:sldId id="258" r:id="rId4"/>
+    <p:sldId id="258" r:id="rId3"/>
+    <p:sldId id="257" r:id="rId4"/>
     <p:sldId id="259" r:id="rId5"/>
     <p:sldId id="260" r:id="rId6"/>
     <p:sldId id="261" r:id="rId7"/>
@@ -111,6 +111,11 @@
       </a:defRPr>
     </a:lvl9pPr>
   </p:defaultTextStyle>
+  <p:extLst>
+    <p:ext uri="{EFAFB233-063F-42B5-8137-9DF3F51BA10A}">
+      <p15:sldGuideLst xmlns:p15="http://schemas.microsoft.com/office/powerpoint/2012/main"/>
+    </p:ext>
+  </p:extLst>
 </p:presentation>
 </file>
 
@@ -5801,6 +5806,267 @@
           <p:cNvPr id="2" name="Title 1">
             <a:extLst>
               <a:ext uri="{FF2B5EF4-FFF2-40B4-BE49-F238E27FC236}">
+                <a16:creationId xmlns:a16="http://schemas.microsoft.com/office/drawing/2014/main" id="{4ECC8770-4F34-1443-8ACC-960C86EBDAAF}"/>
+              </a:ext>
+            </a:extLst>
+          </p:cNvPr>
+          <p:cNvSpPr>
+            <a:spLocks noGrp="1"/>
+          </p:cNvSpPr>
+          <p:nvPr>
+            <p:ph type="title"/>
+          </p:nvPr>
+        </p:nvSpPr>
+        <p:spPr>
+          <a:xfrm>
+            <a:off x="1046410" y="443345"/>
+            <a:ext cx="9905998" cy="910442"/>
+          </a:xfrm>
+        </p:spPr>
+        <p:txBody>
+          <a:bodyPr/>
+          <a:lstStyle/>
+          <a:p>
+            <a:r>
+              <a:rPr lang="en-US" dirty="0"/>
+              <a:t>What is facial recognition?</a:t>
+            </a:r>
+          </a:p>
+        </p:txBody>
+      </p:sp>
+      <p:sp>
+        <p:nvSpPr>
+          <p:cNvPr id="3" name="Content Placeholder 2">
+            <a:extLst>
+              <a:ext uri="{FF2B5EF4-FFF2-40B4-BE49-F238E27FC236}">
+                <a16:creationId xmlns:a16="http://schemas.microsoft.com/office/drawing/2014/main" id="{1E3700E4-D9E4-CC4F-8282-790E902DD9AE}"/>
+              </a:ext>
+            </a:extLst>
+          </p:cNvPr>
+          <p:cNvSpPr>
+            <a:spLocks noGrp="1"/>
+          </p:cNvSpPr>
+          <p:nvPr>
+            <p:ph idx="1"/>
+          </p:nvPr>
+        </p:nvSpPr>
+        <p:spPr>
+          <a:xfrm>
+            <a:off x="1046410" y="1353787"/>
+            <a:ext cx="9905998" cy="5060868"/>
+          </a:xfrm>
+        </p:spPr>
+        <p:txBody>
+          <a:bodyPr>
+            <a:normAutofit fontScale="70000" lnSpcReduction="20000"/>
+          </a:bodyPr>
+          <a:lstStyle/>
+          <a:p>
+            <a:pPr marL="0" indent="0">
+              <a:buNone/>
+            </a:pPr>
+            <a:r>
+              <a:rPr lang="en-GB" sz="2300" cap="none" dirty="0">
+                <a:effectLst/>
+                <a:latin typeface="Times" pitchFamily="2" charset="0"/>
+              </a:rPr>
+              <a:t>Facial recognition is a way of identifying or confirming an individual’s identity using their face. Facial recognition systems can be used to identify people in photos, videos, or in real-time.</a:t>
+            </a:r>
+          </a:p>
+          <a:p>
+            <a:pPr marL="0" indent="0">
+              <a:buNone/>
+            </a:pPr>
+            <a:r>
+              <a:rPr lang="en-GB" sz="2300" cap="none" dirty="0">
+                <a:effectLst/>
+                <a:latin typeface="Times" pitchFamily="2" charset="0"/>
+              </a:rPr>
+              <a:t>Facial recognition is a category of </a:t>
+            </a:r>
+            <a:r>
+              <a:rPr lang="en-GB" sz="2300" cap="none" dirty="0">
+                <a:effectLst/>
+                <a:latin typeface="Times" pitchFamily="2" charset="0"/>
+                <a:hlinkClick r:id="rId2">
+                  <a:extLst>
+                    <a:ext uri="{A12FA001-AC4F-418D-AE19-62706E023703}">
+                      <ahyp:hlinkClr xmlns:ahyp="http://schemas.microsoft.com/office/drawing/2018/hyperlinkcolor" val="tx"/>
+                    </a:ext>
+                  </a:extLst>
+                </a:hlinkClick>
+              </a:rPr>
+              <a:t>biometric security</a:t>
+            </a:r>
+            <a:r>
+              <a:rPr lang="en-GB" sz="2300" cap="none" dirty="0">
+                <a:effectLst/>
+                <a:latin typeface="Times" pitchFamily="2" charset="0"/>
+              </a:rPr>
+              <a:t>. Other forms of biometric software include voice recognition, fingerprint recognition, and eye retina or iris recognition. The technology is mostly used for security and law enforcement, though there is increasing interest in other areas of use.</a:t>
+            </a:r>
+          </a:p>
+          <a:p>
+            <a:pPr marL="0" indent="0" fontAlgn="base">
+              <a:buNone/>
+            </a:pPr>
+            <a:r>
+              <a:rPr lang="en-US" b="1" cap="none" dirty="0">
+                <a:latin typeface="Times" pitchFamily="2" charset="0"/>
+              </a:rPr>
+              <a:t>   COMMON USES: </a:t>
+            </a:r>
+          </a:p>
+          <a:p>
+            <a:pPr fontAlgn="base"/>
+            <a:r>
+              <a:rPr lang="en-GB" cap="none" dirty="0">
+                <a:effectLst/>
+                <a:latin typeface="Times" pitchFamily="2" charset="0"/>
+              </a:rPr>
+              <a:t>Unlocking phones</a:t>
+            </a:r>
+          </a:p>
+          <a:p>
+            <a:pPr fontAlgn="base"/>
+            <a:r>
+              <a:rPr lang="en-GB" cap="none" dirty="0">
+                <a:effectLst/>
+                <a:latin typeface="Times" pitchFamily="2" charset="0"/>
+              </a:rPr>
+              <a:t>Law enforcement</a:t>
+            </a:r>
+          </a:p>
+          <a:p>
+            <a:pPr fontAlgn="base"/>
+            <a:r>
+              <a:rPr lang="en-GB" cap="none" dirty="0">
+                <a:effectLst/>
+                <a:latin typeface="Times" pitchFamily="2" charset="0"/>
+              </a:rPr>
+              <a:t>Airports and border control</a:t>
+            </a:r>
+          </a:p>
+          <a:p>
+            <a:pPr fontAlgn="base"/>
+            <a:r>
+              <a:rPr lang="en-GB" cap="none" dirty="0">
+                <a:effectLst/>
+                <a:latin typeface="Times" pitchFamily="2" charset="0"/>
+              </a:rPr>
+              <a:t>Finding missing persons</a:t>
+            </a:r>
+          </a:p>
+          <a:p>
+            <a:pPr fontAlgn="base"/>
+            <a:r>
+              <a:rPr lang="en-GB" cap="none" dirty="0">
+                <a:effectLst/>
+                <a:latin typeface="Times" pitchFamily="2" charset="0"/>
+              </a:rPr>
+              <a:t>Reducing retail crime</a:t>
+            </a:r>
+          </a:p>
+          <a:p>
+            <a:pPr fontAlgn="base"/>
+            <a:r>
+              <a:rPr lang="en-GB" cap="none" dirty="0">
+                <a:effectLst/>
+                <a:latin typeface="Times" pitchFamily="2" charset="0"/>
+              </a:rPr>
+              <a:t>Improving retail experiences</a:t>
+            </a:r>
+          </a:p>
+          <a:p>
+            <a:pPr fontAlgn="base"/>
+            <a:r>
+              <a:rPr lang="en-GB" cap="none" dirty="0">
+                <a:effectLst/>
+                <a:latin typeface="Times" pitchFamily="2" charset="0"/>
+              </a:rPr>
+              <a:t>Banking</a:t>
+            </a:r>
+          </a:p>
+          <a:p>
+            <a:pPr fontAlgn="base"/>
+            <a:r>
+              <a:rPr lang="en-GB" cap="none" dirty="0">
+                <a:effectLst/>
+                <a:latin typeface="Times" pitchFamily="2" charset="0"/>
+              </a:rPr>
+              <a:t>Marketing and advertising</a:t>
+            </a:r>
+          </a:p>
+          <a:p>
+            <a:pPr fontAlgn="base"/>
+            <a:r>
+              <a:rPr lang="en-GB" cap="none" dirty="0">
+                <a:effectLst/>
+                <a:latin typeface="Times" pitchFamily="2" charset="0"/>
+              </a:rPr>
+              <a:t>Healthcare</a:t>
+            </a:r>
+          </a:p>
+          <a:p>
+            <a:pPr fontAlgn="base"/>
+            <a:r>
+              <a:rPr lang="en-GB" cap="none" dirty="0">
+                <a:effectLst/>
+                <a:latin typeface="Times" pitchFamily="2" charset="0"/>
+              </a:rPr>
+              <a:t>Tracking student or worker attendance</a:t>
+            </a:r>
+          </a:p>
+          <a:p>
+            <a:pPr fontAlgn="base"/>
+            <a:r>
+              <a:rPr lang="en-GB" cap="none" dirty="0">
+                <a:effectLst/>
+                <a:latin typeface="Times" pitchFamily="2" charset="0"/>
+              </a:rPr>
+              <a:t>Recognizing drivers</a:t>
+            </a:r>
+          </a:p>
+          <a:p>
+            <a:endParaRPr lang="en-US" dirty="0"/>
+          </a:p>
+        </p:txBody>
+      </p:sp>
+    </p:spTree>
+    <p:extLst>
+      <p:ext uri="{BB962C8B-B14F-4D97-AF65-F5344CB8AC3E}">
+        <p14:creationId xmlns:p14="http://schemas.microsoft.com/office/powerpoint/2010/main" val="1633665336"/>
+      </p:ext>
+    </p:extLst>
+  </p:cSld>
+  <p:clrMapOvr>
+    <a:masterClrMapping/>
+  </p:clrMapOvr>
+</p:sld>
+</file>
+
+<file path=ppt/slides/slide3.xml><?xml version="1.0" encoding="utf-8"?>
+<p:sld xmlns:a="http://schemas.openxmlformats.org/drawingml/2006/main" xmlns:r="http://schemas.openxmlformats.org/officeDocument/2006/relationships" xmlns:p="http://schemas.openxmlformats.org/presentationml/2006/main">
+  <p:cSld>
+    <p:spTree>
+      <p:nvGrpSpPr>
+        <p:cNvPr id="1" name=""/>
+        <p:cNvGrpSpPr/>
+        <p:nvPr/>
+      </p:nvGrpSpPr>
+      <p:grpSpPr>
+        <a:xfrm>
+          <a:off x="0" y="0"/>
+          <a:ext cx="0" cy="0"/>
+          <a:chOff x="0" y="0"/>
+          <a:chExt cx="0" cy="0"/>
+        </a:xfrm>
+      </p:grpSpPr>
+      <p:sp>
+        <p:nvSpPr>
+          <p:cNvPr id="2" name="Title 1">
+            <a:extLst>
+              <a:ext uri="{FF2B5EF4-FFF2-40B4-BE49-F238E27FC236}">
                 <a16:creationId xmlns:a16="http://schemas.microsoft.com/office/drawing/2014/main" id="{80B0754D-F313-DE49-9BEB-0A5E2FD83E1D}"/>
               </a:ext>
             </a:extLst>
@@ -5874,234 +6140,6 @@
     <p:extLst>
       <p:ext uri="{BB962C8B-B14F-4D97-AF65-F5344CB8AC3E}">
         <p14:creationId xmlns:p14="http://schemas.microsoft.com/office/powerpoint/2010/main" val="2413594630"/>
-      </p:ext>
-    </p:extLst>
-  </p:cSld>
-  <p:clrMapOvr>
-    <a:masterClrMapping/>
-  </p:clrMapOvr>
-</p:sld>
-</file>
-
-<file path=ppt/slides/slide3.xml><?xml version="1.0" encoding="utf-8"?>
-<p:sld xmlns:a="http://schemas.openxmlformats.org/drawingml/2006/main" xmlns:r="http://schemas.openxmlformats.org/officeDocument/2006/relationships" xmlns:p="http://schemas.openxmlformats.org/presentationml/2006/main">
-  <p:cSld>
-    <p:spTree>
-      <p:nvGrpSpPr>
-        <p:cNvPr id="1" name=""/>
-        <p:cNvGrpSpPr/>
-        <p:nvPr/>
-      </p:nvGrpSpPr>
-      <p:grpSpPr>
-        <a:xfrm>
-          <a:off x="0" y="0"/>
-          <a:ext cx="0" cy="0"/>
-          <a:chOff x="0" y="0"/>
-          <a:chExt cx="0" cy="0"/>
-        </a:xfrm>
-      </p:grpSpPr>
-      <p:sp>
-        <p:nvSpPr>
-          <p:cNvPr id="2" name="Title 1">
-            <a:extLst>
-              <a:ext uri="{FF2B5EF4-FFF2-40B4-BE49-F238E27FC236}">
-                <a16:creationId xmlns:a16="http://schemas.microsoft.com/office/drawing/2014/main" id="{4ECC8770-4F34-1443-8ACC-960C86EBDAAF}"/>
-              </a:ext>
-            </a:extLst>
-          </p:cNvPr>
-          <p:cNvSpPr>
-            <a:spLocks noGrp="1"/>
-          </p:cNvSpPr>
-          <p:nvPr>
-            <p:ph type="title"/>
-          </p:nvPr>
-        </p:nvSpPr>
-        <p:spPr>
-          <a:xfrm>
-            <a:off x="1046410" y="443345"/>
-            <a:ext cx="9905998" cy="910442"/>
-          </a:xfrm>
-        </p:spPr>
-        <p:txBody>
-          <a:bodyPr/>
-          <a:lstStyle/>
-          <a:p>
-            <a:r>
-              <a:rPr lang="en-US" dirty="0"/>
-              <a:t>What is facial recognition?</a:t>
-            </a:r>
-          </a:p>
-        </p:txBody>
-      </p:sp>
-      <p:sp>
-        <p:nvSpPr>
-          <p:cNvPr id="3" name="Content Placeholder 2">
-            <a:extLst>
-              <a:ext uri="{FF2B5EF4-FFF2-40B4-BE49-F238E27FC236}">
-                <a16:creationId xmlns:a16="http://schemas.microsoft.com/office/drawing/2014/main" id="{1E3700E4-D9E4-CC4F-8282-790E902DD9AE}"/>
-              </a:ext>
-            </a:extLst>
-          </p:cNvPr>
-          <p:cNvSpPr>
-            <a:spLocks noGrp="1"/>
-          </p:cNvSpPr>
-          <p:nvPr>
-            <p:ph idx="1"/>
-          </p:nvPr>
-        </p:nvSpPr>
-        <p:spPr>
-          <a:xfrm>
-            <a:off x="1046410" y="1353787"/>
-            <a:ext cx="9905998" cy="4785756"/>
-          </a:xfrm>
-        </p:spPr>
-        <p:txBody>
-          <a:bodyPr>
-            <a:normAutofit fontScale="85000" lnSpcReduction="20000"/>
-          </a:bodyPr>
-          <a:lstStyle/>
-          <a:p>
-            <a:pPr marL="0" indent="0">
-              <a:buNone/>
-            </a:pPr>
-            <a:r>
-              <a:rPr lang="en-GB" cap="none" dirty="0">
-                <a:effectLst/>
-                <a:latin typeface="Times" pitchFamily="2" charset="0"/>
-              </a:rPr>
-              <a:t>Facial recognition is a way of identifying or confirming an individual’s identity using their face. Facial       recognition systems can be used to identify people in photos, videos, or in real-time.</a:t>
-            </a:r>
-          </a:p>
-          <a:p>
-            <a:pPr marL="0" indent="0" fontAlgn="base">
-              <a:buNone/>
-            </a:pPr>
-            <a:r>
-              <a:rPr lang="en-US" b="1" cap="none" dirty="0">
-                <a:latin typeface="Times" pitchFamily="2" charset="0"/>
-              </a:rPr>
-              <a:t>   USES: </a:t>
-            </a:r>
-          </a:p>
-          <a:p>
-            <a:pPr fontAlgn="base"/>
-            <a:r>
-              <a:rPr lang="en-GB" cap="none" dirty="0">
-                <a:effectLst/>
-                <a:latin typeface="Times" pitchFamily="2" charset="0"/>
-              </a:rPr>
-              <a:t>Unlocking phones</a:t>
-            </a:r>
-          </a:p>
-          <a:p>
-            <a:pPr fontAlgn="base"/>
-            <a:r>
-              <a:rPr lang="en-GB" cap="none" dirty="0">
-                <a:effectLst/>
-                <a:latin typeface="Times" pitchFamily="2" charset="0"/>
-              </a:rPr>
-              <a:t>Law enforcement</a:t>
-            </a:r>
-          </a:p>
-          <a:p>
-            <a:pPr fontAlgn="base"/>
-            <a:r>
-              <a:rPr lang="en-GB" cap="none" dirty="0">
-                <a:effectLst/>
-                <a:latin typeface="Times" pitchFamily="2" charset="0"/>
-              </a:rPr>
-              <a:t>Airports and border control</a:t>
-            </a:r>
-          </a:p>
-          <a:p>
-            <a:pPr fontAlgn="base"/>
-            <a:r>
-              <a:rPr lang="en-GB" cap="none" dirty="0">
-                <a:effectLst/>
-                <a:latin typeface="Times" pitchFamily="2" charset="0"/>
-              </a:rPr>
-              <a:t>Finding missing persons</a:t>
-            </a:r>
-          </a:p>
-          <a:p>
-            <a:pPr fontAlgn="base"/>
-            <a:r>
-              <a:rPr lang="en-GB" cap="none" dirty="0">
-                <a:effectLst/>
-                <a:latin typeface="Times" pitchFamily="2" charset="0"/>
-              </a:rPr>
-              <a:t>Reducing retail crime</a:t>
-            </a:r>
-          </a:p>
-          <a:p>
-            <a:pPr fontAlgn="base"/>
-            <a:r>
-              <a:rPr lang="en-GB" cap="none" dirty="0">
-                <a:effectLst/>
-                <a:latin typeface="Times" pitchFamily="2" charset="0"/>
-              </a:rPr>
-              <a:t>Improving retail experiences</a:t>
-            </a:r>
-          </a:p>
-          <a:p>
-            <a:pPr fontAlgn="base"/>
-            <a:r>
-              <a:rPr lang="en-GB" cap="none" dirty="0">
-                <a:effectLst/>
-                <a:latin typeface="Times" pitchFamily="2" charset="0"/>
-              </a:rPr>
-              <a:t>Banking</a:t>
-            </a:r>
-          </a:p>
-          <a:p>
-            <a:pPr fontAlgn="base"/>
-            <a:r>
-              <a:rPr lang="en-GB" cap="none" dirty="0">
-                <a:effectLst/>
-                <a:latin typeface="Times" pitchFamily="2" charset="0"/>
-              </a:rPr>
-              <a:t>Marketing and advertising</a:t>
-            </a:r>
-          </a:p>
-          <a:p>
-            <a:pPr fontAlgn="base"/>
-            <a:r>
-              <a:rPr lang="en-GB" cap="none" dirty="0">
-                <a:effectLst/>
-                <a:latin typeface="Times" pitchFamily="2" charset="0"/>
-              </a:rPr>
-              <a:t>Healthcare</a:t>
-            </a:r>
-          </a:p>
-          <a:p>
-            <a:pPr fontAlgn="base"/>
-            <a:r>
-              <a:rPr lang="en-GB" cap="none" dirty="0">
-                <a:effectLst/>
-                <a:latin typeface="Times" pitchFamily="2" charset="0"/>
-              </a:rPr>
-              <a:t>Tracking student or worker attendance</a:t>
-            </a:r>
-          </a:p>
-          <a:p>
-            <a:pPr fontAlgn="base"/>
-            <a:r>
-              <a:rPr lang="en-GB" cap="none" dirty="0">
-                <a:effectLst/>
-                <a:latin typeface="Times" pitchFamily="2" charset="0"/>
-              </a:rPr>
-              <a:t>Recognizing drivers</a:t>
-            </a:r>
-          </a:p>
-          <a:p>
-            <a:endParaRPr lang="en-US" dirty="0"/>
-          </a:p>
-        </p:txBody>
-      </p:sp>
-    </p:spTree>
-    <p:extLst>
-      <p:ext uri="{BB962C8B-B14F-4D97-AF65-F5344CB8AC3E}">
-        <p14:creationId xmlns:p14="http://schemas.microsoft.com/office/powerpoint/2010/main" val="1633665336"/>
       </p:ext>
     </p:extLst>
   </p:cSld>

</xml_diff>